<commit_message>
Especificando funcionamento do HD
</commit_message>
<xml_diff>
--- a/src/cenarios.pptx
+++ b/src/cenarios.pptx
@@ -5,7 +5,9 @@
     <p:sldMasterId id="2147483648" r:id="rId1"/>
   </p:sldMasterIdLst>
   <p:sldIdLst>
-    <p:sldId id="256" r:id="rId2"/>
+    <p:sldId id="257" r:id="rId2"/>
+    <p:sldId id="256" r:id="rId3"/>
+    <p:sldId id="258" r:id="rId4"/>
   </p:sldIdLst>
   <p:sldSz cx="12192000" cy="6858000"/>
   <p:notesSz cx="6858000" cy="9144000"/>
@@ -104,6 +106,11 @@
       </a:defRPr>
     </a:lvl9pPr>
   </p:defaultTextStyle>
+  <p:extLst>
+    <p:ext uri="{EFAFB233-063F-42B5-8137-9DF3F51BA10A}">
+      <p15:sldGuideLst xmlns:p15="http://schemas.microsoft.com/office/powerpoint/2012/main"/>
+    </p:ext>
+  </p:extLst>
 </p:presentation>
 </file>
 
@@ -238,7 +245,7 @@
           <a:p>
             <a:fld id="{876632CE-2747-4BDE-8E31-C676E6B91D12}" type="datetimeFigureOut">
               <a:rPr lang="pt-BR" smtClean="0"/>
-              <a:t>28/03/2018</a:t>
+              <a:t>03/04/2018</a:t>
             </a:fld>
             <a:endParaRPr lang="pt-BR"/>
           </a:p>
@@ -408,7 +415,7 @@
           <a:p>
             <a:fld id="{876632CE-2747-4BDE-8E31-C676E6B91D12}" type="datetimeFigureOut">
               <a:rPr lang="pt-BR" smtClean="0"/>
-              <a:t>28/03/2018</a:t>
+              <a:t>03/04/2018</a:t>
             </a:fld>
             <a:endParaRPr lang="pt-BR"/>
           </a:p>
@@ -588,7 +595,7 @@
           <a:p>
             <a:fld id="{876632CE-2747-4BDE-8E31-C676E6B91D12}" type="datetimeFigureOut">
               <a:rPr lang="pt-BR" smtClean="0"/>
-              <a:t>28/03/2018</a:t>
+              <a:t>03/04/2018</a:t>
             </a:fld>
             <a:endParaRPr lang="pt-BR"/>
           </a:p>
@@ -758,7 +765,7 @@
           <a:p>
             <a:fld id="{876632CE-2747-4BDE-8E31-C676E6B91D12}" type="datetimeFigureOut">
               <a:rPr lang="pt-BR" smtClean="0"/>
-              <a:t>28/03/2018</a:t>
+              <a:t>03/04/2018</a:t>
             </a:fld>
             <a:endParaRPr lang="pt-BR"/>
           </a:p>
@@ -1004,7 +1011,7 @@
           <a:p>
             <a:fld id="{876632CE-2747-4BDE-8E31-C676E6B91D12}" type="datetimeFigureOut">
               <a:rPr lang="pt-BR" smtClean="0"/>
-              <a:t>28/03/2018</a:t>
+              <a:t>03/04/2018</a:t>
             </a:fld>
             <a:endParaRPr lang="pt-BR"/>
           </a:p>
@@ -1236,7 +1243,7 @@
           <a:p>
             <a:fld id="{876632CE-2747-4BDE-8E31-C676E6B91D12}" type="datetimeFigureOut">
               <a:rPr lang="pt-BR" smtClean="0"/>
-              <a:t>28/03/2018</a:t>
+              <a:t>03/04/2018</a:t>
             </a:fld>
             <a:endParaRPr lang="pt-BR"/>
           </a:p>
@@ -1603,7 +1610,7 @@
           <a:p>
             <a:fld id="{876632CE-2747-4BDE-8E31-C676E6B91D12}" type="datetimeFigureOut">
               <a:rPr lang="pt-BR" smtClean="0"/>
-              <a:t>28/03/2018</a:t>
+              <a:t>03/04/2018</a:t>
             </a:fld>
             <a:endParaRPr lang="pt-BR"/>
           </a:p>
@@ -1721,7 +1728,7 @@
           <a:p>
             <a:fld id="{876632CE-2747-4BDE-8E31-C676E6B91D12}" type="datetimeFigureOut">
               <a:rPr lang="pt-BR" smtClean="0"/>
-              <a:t>28/03/2018</a:t>
+              <a:t>03/04/2018</a:t>
             </a:fld>
             <a:endParaRPr lang="pt-BR"/>
           </a:p>
@@ -1816,7 +1823,7 @@
           <a:p>
             <a:fld id="{876632CE-2747-4BDE-8E31-C676E6B91D12}" type="datetimeFigureOut">
               <a:rPr lang="pt-BR" smtClean="0"/>
-              <a:t>28/03/2018</a:t>
+              <a:t>03/04/2018</a:t>
             </a:fld>
             <a:endParaRPr lang="pt-BR"/>
           </a:p>
@@ -2093,7 +2100,7 @@
           <a:p>
             <a:fld id="{876632CE-2747-4BDE-8E31-C676E6B91D12}" type="datetimeFigureOut">
               <a:rPr lang="pt-BR" smtClean="0"/>
-              <a:t>28/03/2018</a:t>
+              <a:t>03/04/2018</a:t>
             </a:fld>
             <a:endParaRPr lang="pt-BR"/>
           </a:p>
@@ -2346,7 +2353,7 @@
           <a:p>
             <a:fld id="{876632CE-2747-4BDE-8E31-C676E6B91D12}" type="datetimeFigureOut">
               <a:rPr lang="pt-BR" smtClean="0"/>
-              <a:t>28/03/2018</a:t>
+              <a:t>03/04/2018</a:t>
             </a:fld>
             <a:endParaRPr lang="pt-BR"/>
           </a:p>
@@ -2559,7 +2566,7 @@
           <a:p>
             <a:fld id="{876632CE-2747-4BDE-8E31-C676E6B91D12}" type="datetimeFigureOut">
               <a:rPr lang="pt-BR" smtClean="0"/>
-              <a:t>28/03/2018</a:t>
+              <a:t>03/04/2018</a:t>
             </a:fld>
             <a:endParaRPr lang="pt-BR"/>
           </a:p>
@@ -2964,9 +2971,35 @@
           <a:chExt cx="0" cy="0"/>
         </a:xfrm>
       </p:grpSpPr>
+      <p:sp>
+        <p:nvSpPr>
+          <p:cNvPr id="2" name="Título 1"/>
+          <p:cNvSpPr>
+            <a:spLocks noGrp="1"/>
+          </p:cNvSpPr>
+          <p:nvPr>
+            <p:ph type="title"/>
+          </p:nvPr>
+        </p:nvSpPr>
+        <p:spPr/>
+        <p:txBody>
+          <a:bodyPr>
+            <a:normAutofit/>
+          </a:bodyPr>
+          <a:lstStyle/>
+          <a:p>
+            <a:pPr algn="ctr"/>
+            <a:r>
+              <a:rPr lang="pt-BR" sz="2800" dirty="0" smtClean="0"/>
+              <a:t>Descrição do funcionamento dos blocos</a:t>
+            </a:r>
+            <a:endParaRPr lang="pt-BR" sz="2800" dirty="0"/>
+          </a:p>
+        </p:txBody>
+      </p:sp>
       <p:pic>
         <p:nvPicPr>
-          <p:cNvPr id="9" name="Imagem 8"/>
+          <p:cNvPr id="6" name="Imagem 5"/>
           <p:cNvPicPr>
             <a:picLocks noChangeAspect="1"/>
           </p:cNvPicPr>
@@ -2980,14 +3013,68 @@
         </p:blipFill>
         <p:spPr>
           <a:xfrm>
-            <a:off x="306901" y="1006818"/>
-            <a:ext cx="11739957" cy="1662468"/>
+            <a:off x="3298296" y="1566341"/>
+            <a:ext cx="3892857" cy="4916534"/>
           </a:xfrm>
           <a:prstGeom prst="rect">
             <a:avLst/>
           </a:prstGeom>
         </p:spPr>
       </p:pic>
+      <p:pic>
+        <p:nvPicPr>
+          <p:cNvPr id="10" name="Imagem 9"/>
+          <p:cNvPicPr>
+            <a:picLocks noChangeAspect="1"/>
+          </p:cNvPicPr>
+          <p:nvPr/>
+        </p:nvPicPr>
+        <p:blipFill>
+          <a:blip r:embed="rId3"/>
+          <a:stretch>
+            <a:fillRect/>
+          </a:stretch>
+        </p:blipFill>
+        <p:spPr>
+          <a:xfrm>
+            <a:off x="7471575" y="1566341"/>
+            <a:ext cx="1468800" cy="2060400"/>
+          </a:xfrm>
+          <a:prstGeom prst="rect">
+            <a:avLst/>
+          </a:prstGeom>
+        </p:spPr>
+      </p:pic>
+    </p:spTree>
+    <p:extLst>
+      <p:ext uri="{BB962C8B-B14F-4D97-AF65-F5344CB8AC3E}">
+        <p14:creationId xmlns:p14="http://schemas.microsoft.com/office/powerpoint/2010/main" val="4098673726"/>
+      </p:ext>
+    </p:extLst>
+  </p:cSld>
+  <p:clrMapOvr>
+    <a:masterClrMapping/>
+  </p:clrMapOvr>
+</p:sld>
+</file>
+
+<file path=ppt/slides/slide2.xml><?xml version="1.0" encoding="utf-8"?>
+<p:sld xmlns:a="http://schemas.openxmlformats.org/drawingml/2006/main" xmlns:r="http://schemas.openxmlformats.org/officeDocument/2006/relationships" xmlns:p="http://schemas.openxmlformats.org/presentationml/2006/main">
+  <p:cSld>
+    <p:spTree>
+      <p:nvGrpSpPr>
+        <p:cNvPr id="1" name=""/>
+        <p:cNvGrpSpPr/>
+        <p:nvPr/>
+      </p:nvGrpSpPr>
+      <p:grpSpPr>
+        <a:xfrm>
+          <a:off x="0" y="0"/>
+          <a:ext cx="0" cy="0"/>
+          <a:chOff x="0" y="0"/>
+          <a:chExt cx="0" cy="0"/>
+        </a:xfrm>
+      </p:grpSpPr>
       <p:sp>
         <p:nvSpPr>
           <p:cNvPr id="10" name="CaixaDeTexto 9"/>
@@ -2996,8 +3083,8 @@
         </p:nvSpPr>
         <p:spPr>
           <a:xfrm>
-            <a:off x="2781301" y="449580"/>
-            <a:ext cx="3831770" cy="369332"/>
+            <a:off x="400051" y="449580"/>
+            <a:ext cx="9420224" cy="369332"/>
           </a:xfrm>
           <a:prstGeom prst="rect">
             <a:avLst/>
@@ -3012,16 +3099,238 @@
           <a:p>
             <a:r>
               <a:rPr lang="pt-BR" dirty="0" smtClean="0"/>
-              <a:t>Cenário 01</a:t>
+              <a:t>Cenário </a:t>
+            </a:r>
+            <a:r>
+              <a:rPr lang="pt-BR" dirty="0" smtClean="0"/>
+              <a:t>01 (criando </a:t>
+            </a:r>
+            <a:r>
+              <a:rPr lang="pt-BR" dirty="0" err="1" smtClean="0"/>
+              <a:t>Arquivo_A</a:t>
+            </a:r>
+            <a:r>
+              <a:rPr lang="pt-BR" dirty="0" smtClean="0"/>
+              <a:t>, </a:t>
+            </a:r>
+            <a:r>
+              <a:rPr lang="pt-BR" dirty="0" err="1" smtClean="0"/>
+              <a:t>Arquivo_B</a:t>
+            </a:r>
+            <a:r>
+              <a:rPr lang="pt-BR" dirty="0" smtClean="0"/>
+              <a:t>, </a:t>
+            </a:r>
+            <a:r>
+              <a:rPr lang="pt-BR" dirty="0" err="1" smtClean="0"/>
+              <a:t>Arquivo_C</a:t>
+            </a:r>
+            <a:r>
+              <a:rPr lang="pt-BR" dirty="0" smtClean="0"/>
+              <a:t>)</a:t>
             </a:r>
             <a:endParaRPr lang="pt-BR" dirty="0"/>
           </a:p>
         </p:txBody>
       </p:sp>
+      <p:pic>
+        <p:nvPicPr>
+          <p:cNvPr id="3" name="Imagem 2"/>
+          <p:cNvPicPr>
+            <a:picLocks noChangeAspect="1"/>
+          </p:cNvPicPr>
+          <p:nvPr/>
+        </p:nvPicPr>
+        <p:blipFill>
+          <a:blip r:embed="rId2"/>
+          <a:stretch>
+            <a:fillRect/>
+          </a:stretch>
+        </p:blipFill>
+        <p:spPr>
+          <a:xfrm>
+            <a:off x="400051" y="825027"/>
+            <a:ext cx="11586456" cy="1642524"/>
+          </a:xfrm>
+          <a:prstGeom prst="rect">
+            <a:avLst/>
+          </a:prstGeom>
+        </p:spPr>
+      </p:pic>
+      <p:sp>
+        <p:nvSpPr>
+          <p:cNvPr id="4" name="CaixaDeTexto 3"/>
+          <p:cNvSpPr txBox="1"/>
+          <p:nvPr/>
+        </p:nvSpPr>
+        <p:spPr>
+          <a:xfrm>
+            <a:off x="400051" y="3104147"/>
+            <a:ext cx="5964654" cy="369332"/>
+          </a:xfrm>
+          <a:prstGeom prst="rect">
+            <a:avLst/>
+          </a:prstGeom>
+          <a:noFill/>
+        </p:spPr>
+        <p:txBody>
+          <a:bodyPr wrap="square" rtlCol="0">
+            <a:spAutoFit/>
+          </a:bodyPr>
+          <a:lstStyle/>
+          <a:p>
+            <a:r>
+              <a:rPr lang="pt-BR" dirty="0" smtClean="0"/>
+              <a:t>Cenário 02 (excluindo </a:t>
+            </a:r>
+            <a:r>
+              <a:rPr lang="pt-BR" dirty="0" err="1" smtClean="0"/>
+              <a:t>Arquivo_B</a:t>
+            </a:r>
+            <a:r>
+              <a:rPr lang="pt-BR" dirty="0" smtClean="0"/>
+              <a:t> e criando </a:t>
+            </a:r>
+            <a:r>
+              <a:rPr lang="pt-BR" dirty="0" err="1" smtClean="0"/>
+              <a:t>Arquivo_D</a:t>
+            </a:r>
+            <a:r>
+              <a:rPr lang="pt-BR" dirty="0" smtClean="0"/>
+              <a:t>)</a:t>
+            </a:r>
+            <a:endParaRPr lang="pt-BR" dirty="0"/>
+          </a:p>
+        </p:txBody>
+      </p:sp>
+      <p:pic>
+        <p:nvPicPr>
+          <p:cNvPr id="8" name="Imagem 7"/>
+          <p:cNvPicPr>
+            <a:picLocks noChangeAspect="1"/>
+          </p:cNvPicPr>
+          <p:nvPr/>
+        </p:nvPicPr>
+        <p:blipFill>
+          <a:blip r:embed="rId3"/>
+          <a:stretch>
+            <a:fillRect/>
+          </a:stretch>
+        </p:blipFill>
+        <p:spPr>
+          <a:xfrm>
+            <a:off x="400051" y="3473479"/>
+            <a:ext cx="11586456" cy="1814688"/>
+          </a:xfrm>
+          <a:prstGeom prst="rect">
+            <a:avLst/>
+          </a:prstGeom>
+        </p:spPr>
+      </p:pic>
     </p:spTree>
     <p:extLst>
       <p:ext uri="{BB962C8B-B14F-4D97-AF65-F5344CB8AC3E}">
         <p14:creationId xmlns:p14="http://schemas.microsoft.com/office/powerpoint/2010/main" val="3755626453"/>
+      </p:ext>
+    </p:extLst>
+  </p:cSld>
+  <p:clrMapOvr>
+    <a:masterClrMapping/>
+  </p:clrMapOvr>
+</p:sld>
+</file>
+
+<file path=ppt/slides/slide3.xml><?xml version="1.0" encoding="utf-8"?>
+<p:sld xmlns:a="http://schemas.openxmlformats.org/drawingml/2006/main" xmlns:r="http://schemas.openxmlformats.org/officeDocument/2006/relationships" xmlns:p="http://schemas.openxmlformats.org/presentationml/2006/main">
+  <p:cSld>
+    <p:spTree>
+      <p:nvGrpSpPr>
+        <p:cNvPr id="1" name=""/>
+        <p:cNvGrpSpPr/>
+        <p:nvPr/>
+      </p:nvGrpSpPr>
+      <p:grpSpPr>
+        <a:xfrm>
+          <a:off x="0" y="0"/>
+          <a:ext cx="0" cy="0"/>
+          <a:chOff x="0" y="0"/>
+          <a:chExt cx="0" cy="0"/>
+        </a:xfrm>
+      </p:grpSpPr>
+      <p:sp>
+        <p:nvSpPr>
+          <p:cNvPr id="6" name="CaixaDeTexto 5"/>
+          <p:cNvSpPr txBox="1"/>
+          <p:nvPr/>
+        </p:nvSpPr>
+        <p:spPr>
+          <a:xfrm>
+            <a:off x="518849" y="741996"/>
+            <a:ext cx="8696325" cy="369332"/>
+          </a:xfrm>
+          <a:prstGeom prst="rect">
+            <a:avLst/>
+          </a:prstGeom>
+          <a:noFill/>
+        </p:spPr>
+        <p:txBody>
+          <a:bodyPr wrap="square" rtlCol="0">
+            <a:spAutoFit/>
+          </a:bodyPr>
+          <a:lstStyle/>
+          <a:p>
+            <a:r>
+              <a:rPr lang="pt-BR" dirty="0" smtClean="0"/>
+              <a:t>Cenário 03 (criando </a:t>
+            </a:r>
+            <a:r>
+              <a:rPr lang="pt-BR" dirty="0" err="1" smtClean="0"/>
+              <a:t>Arquivo_E</a:t>
+            </a:r>
+            <a:r>
+              <a:rPr lang="pt-BR" dirty="0" smtClean="0"/>
+              <a:t> com 140 </a:t>
+            </a:r>
+            <a:r>
+              <a:rPr lang="pt-BR" dirty="0" err="1" smtClean="0"/>
+              <a:t>bites</a:t>
+            </a:r>
+            <a:r>
+              <a:rPr lang="pt-BR" dirty="0" smtClean="0"/>
+              <a:t> para utilizar mais de um bloco)</a:t>
+            </a:r>
+            <a:endParaRPr lang="pt-BR" dirty="0"/>
+          </a:p>
+        </p:txBody>
+      </p:sp>
+      <p:pic>
+        <p:nvPicPr>
+          <p:cNvPr id="8" name="Imagem 7"/>
+          <p:cNvPicPr>
+            <a:picLocks noChangeAspect="1"/>
+          </p:cNvPicPr>
+          <p:nvPr/>
+        </p:nvPicPr>
+        <p:blipFill>
+          <a:blip r:embed="rId2"/>
+          <a:stretch>
+            <a:fillRect/>
+          </a:stretch>
+        </p:blipFill>
+        <p:spPr>
+          <a:xfrm>
+            <a:off x="518849" y="1111328"/>
+            <a:ext cx="11416477" cy="1824377"/>
+          </a:xfrm>
+          <a:prstGeom prst="rect">
+            <a:avLst/>
+          </a:prstGeom>
+        </p:spPr>
+      </p:pic>
+    </p:spTree>
+    <p:extLst>
+      <p:ext uri="{BB962C8B-B14F-4D97-AF65-F5344CB8AC3E}">
+        <p14:creationId xmlns:p14="http://schemas.microsoft.com/office/powerpoint/2010/main" val="4081146635"/>
       </p:ext>
     </p:extLst>
   </p:cSld>

</xml_diff>